<commit_message>
Adding proposal, powerpoint almost done
</commit_message>
<xml_diff>
--- a/documents/proposal_presentation.pptx
+++ b/documents/proposal_presentation.pptx
@@ -6,6 +6,10 @@
   </p:sldMasterIdLst>
   <p:sldIdLst>
     <p:sldId id="256" r:id="rId2"/>
+    <p:sldId id="257" r:id="rId3"/>
+    <p:sldId id="258" r:id="rId4"/>
+    <p:sldId id="259" r:id="rId5"/>
+    <p:sldId id="260" r:id="rId6"/>
   </p:sldIdLst>
   <p:sldSz cx="12192000" cy="6858000"/>
   <p:notesSz cx="6858000" cy="9144000"/>
@@ -104,6 +108,11 @@
       </a:defRPr>
     </a:lvl9pPr>
   </p:defaultTextStyle>
+  <p:extLst>
+    <p:ext uri="{EFAFB233-063F-42B5-8137-9DF3F51BA10A}">
+      <p15:sldGuideLst xmlns:p15="http://schemas.microsoft.com/office/powerpoint/2012/main"/>
+    </p:ext>
+  </p:extLst>
 </p:presentation>
 </file>
 
@@ -296,7 +305,7 @@
             <a:fld id="{B61BEF0D-F0BB-DE4B-95CE-6DB70DBA9567}" type="datetimeFigureOut">
               <a:rPr lang="en-US" dirty="0"/>
               <a:pPr/>
-              <a:t>1/21/18</a:t>
+              <a:t>1/22/18</a:t>
             </a:fld>
             <a:endParaRPr lang="en-US" dirty="0"/>
           </a:p>
@@ -631,7 +640,7 @@
             <a:fld id="{B61BEF0D-F0BB-DE4B-95CE-6DB70DBA9567}" type="datetimeFigureOut">
               <a:rPr lang="en-US" dirty="0"/>
               <a:pPr/>
-              <a:t>1/21/18</a:t>
+              <a:t>1/22/18</a:t>
             </a:fld>
             <a:endParaRPr lang="en-US" dirty="0"/>
           </a:p>
@@ -1029,7 +1038,7 @@
             <a:fld id="{B61BEF0D-F0BB-DE4B-95CE-6DB70DBA9567}" type="datetimeFigureOut">
               <a:rPr lang="en-US" dirty="0"/>
               <a:pPr/>
-              <a:t>1/21/18</a:t>
+              <a:t>1/22/18</a:t>
             </a:fld>
             <a:endParaRPr lang="en-US" dirty="0"/>
           </a:p>
@@ -1362,7 +1371,7 @@
             <a:fld id="{B61BEF0D-F0BB-DE4B-95CE-6DB70DBA9567}" type="datetimeFigureOut">
               <a:rPr lang="en-US" dirty="0"/>
               <a:pPr/>
-              <a:t>1/21/18</a:t>
+              <a:t>1/22/18</a:t>
             </a:fld>
             <a:endParaRPr lang="en-US" dirty="0"/>
           </a:p>
@@ -1679,7 +1688,7 @@
             <a:fld id="{B61BEF0D-F0BB-DE4B-95CE-6DB70DBA9567}" type="datetimeFigureOut">
               <a:rPr lang="en-US" dirty="0"/>
               <a:pPr/>
-              <a:t>1/21/18</a:t>
+              <a:t>1/22/18</a:t>
             </a:fld>
             <a:endParaRPr lang="en-US" dirty="0"/>
           </a:p>
@@ -2072,7 +2081,7 @@
             <a:fld id="{B61BEF0D-F0BB-DE4B-95CE-6DB70DBA9567}" type="datetimeFigureOut">
               <a:rPr lang="en-US" dirty="0"/>
               <a:pPr/>
-              <a:t>1/21/18</a:t>
+              <a:t>1/22/18</a:t>
             </a:fld>
             <a:endParaRPr lang="en-US" dirty="0"/>
           </a:p>
@@ -2326,7 +2335,7 @@
             <a:fld id="{B61BEF0D-F0BB-DE4B-95CE-6DB70DBA9567}" type="datetimeFigureOut">
               <a:rPr lang="en-US" dirty="0"/>
               <a:pPr/>
-              <a:t>1/21/18</a:t>
+              <a:t>1/22/18</a:t>
             </a:fld>
             <a:endParaRPr lang="en-US" dirty="0"/>
           </a:p>
@@ -2585,7 +2594,7 @@
             <a:fld id="{B61BEF0D-F0BB-DE4B-95CE-6DB70DBA9567}" type="datetimeFigureOut">
               <a:rPr lang="en-US" dirty="0"/>
               <a:pPr/>
-              <a:t>1/21/18</a:t>
+              <a:t>1/22/18</a:t>
             </a:fld>
             <a:endParaRPr lang="en-US" dirty="0"/>
           </a:p>
@@ -2844,7 +2853,7 @@
             <a:fld id="{B61BEF0D-F0BB-DE4B-95CE-6DB70DBA9567}" type="datetimeFigureOut">
               <a:rPr lang="en-US" dirty="0"/>
               <a:pPr/>
-              <a:t>1/21/18</a:t>
+              <a:t>1/22/18</a:t>
             </a:fld>
             <a:endParaRPr lang="en-US" dirty="0"/>
           </a:p>
@@ -3170,7 +3179,7 @@
             <a:fld id="{B61BEF0D-F0BB-DE4B-95CE-6DB70DBA9567}" type="datetimeFigureOut">
               <a:rPr lang="en-US" dirty="0"/>
               <a:pPr/>
-              <a:t>1/21/18</a:t>
+              <a:t>1/22/18</a:t>
             </a:fld>
             <a:endParaRPr lang="en-US" dirty="0"/>
           </a:p>
@@ -3490,7 +3499,7 @@
             <a:fld id="{B61BEF0D-F0BB-DE4B-95CE-6DB70DBA9567}" type="datetimeFigureOut">
               <a:rPr lang="en-US" dirty="0"/>
               <a:pPr/>
-              <a:t>1/21/18</a:t>
+              <a:t>1/22/18</a:t>
             </a:fld>
             <a:endParaRPr lang="en-US" dirty="0"/>
           </a:p>
@@ -3944,7 +3953,7 @@
             <a:fld id="{B61BEF0D-F0BB-DE4B-95CE-6DB70DBA9567}" type="datetimeFigureOut">
               <a:rPr lang="en-US" dirty="0"/>
               <a:pPr/>
-              <a:t>1/21/18</a:t>
+              <a:t>1/22/18</a:t>
             </a:fld>
             <a:endParaRPr lang="en-US" dirty="0"/>
           </a:p>
@@ -4146,7 +4155,7 @@
             <a:fld id="{B61BEF0D-F0BB-DE4B-95CE-6DB70DBA9567}" type="datetimeFigureOut">
               <a:rPr lang="en-US" dirty="0"/>
               <a:pPr/>
-              <a:t>1/21/18</a:t>
+              <a:t>1/22/18</a:t>
             </a:fld>
             <a:endParaRPr lang="en-US" dirty="0"/>
           </a:p>
@@ -4320,7 +4329,7 @@
             <a:fld id="{B61BEF0D-F0BB-DE4B-95CE-6DB70DBA9567}" type="datetimeFigureOut">
               <a:rPr lang="en-US" dirty="0"/>
               <a:pPr/>
-              <a:t>1/21/18</a:t>
+              <a:t>1/22/18</a:t>
             </a:fld>
             <a:endParaRPr lang="en-US" dirty="0"/>
           </a:p>
@@ -4650,7 +4659,7 @@
             <a:fld id="{B61BEF0D-F0BB-DE4B-95CE-6DB70DBA9567}" type="datetimeFigureOut">
               <a:rPr lang="en-US" dirty="0"/>
               <a:pPr/>
-              <a:t>1/21/18</a:t>
+              <a:t>1/22/18</a:t>
             </a:fld>
             <a:endParaRPr lang="en-US" dirty="0"/>
           </a:p>
@@ -4992,7 +5001,7 @@
             <a:fld id="{B61BEF0D-F0BB-DE4B-95CE-6DB70DBA9567}" type="datetimeFigureOut">
               <a:rPr lang="en-US" dirty="0"/>
               <a:pPr/>
-              <a:t>1/21/18</a:t>
+              <a:t>1/22/18</a:t>
             </a:fld>
             <a:endParaRPr lang="en-US" dirty="0"/>
           </a:p>
@@ -7106,7 +7115,7 @@
             <a:fld id="{B61BEF0D-F0BB-DE4B-95CE-6DB70DBA9567}" type="datetimeFigureOut">
               <a:rPr lang="en-US" dirty="0"/>
               <a:pPr/>
-              <a:t>1/21/18</a:t>
+              <a:t>1/22/18</a:t>
             </a:fld>
             <a:endParaRPr lang="en-US" dirty="0"/>
           </a:p>
@@ -7637,8 +7646,12 @@
           <a:p>
             <a:pPr algn="ctr"/>
             <a:r>
-              <a:rPr lang="en-US" smtClean="0"/>
-              <a:t>Client-Server Application</a:t>
+              <a:rPr lang="en-US" dirty="0" smtClean="0"/>
+              <a:t>Client-Server </a:t>
+            </a:r>
+            <a:r>
+              <a:rPr lang="en-US" dirty="0" smtClean="0"/>
+              <a:t>Storage</a:t>
             </a:r>
             <a:endParaRPr lang="en-US" dirty="0"/>
           </a:p>
@@ -7687,6 +7700,432 @@
     <p:extLst>
       <p:ext uri="{BB962C8B-B14F-4D97-AF65-F5344CB8AC3E}">
         <p14:creationId xmlns:p14="http://schemas.microsoft.com/office/powerpoint/2010/main" val="1774016257"/>
+      </p:ext>
+    </p:extLst>
+  </p:cSld>
+  <p:clrMapOvr>
+    <a:masterClrMapping/>
+  </p:clrMapOvr>
+</p:sld>
+</file>
+
+<file path=ppt/slides/slide2.xml><?xml version="1.0" encoding="utf-8"?>
+<p:sld xmlns:a="http://schemas.openxmlformats.org/drawingml/2006/main" xmlns:r="http://schemas.openxmlformats.org/officeDocument/2006/relationships" xmlns:p="http://schemas.openxmlformats.org/presentationml/2006/main">
+  <p:cSld>
+    <p:spTree>
+      <p:nvGrpSpPr>
+        <p:cNvPr id="1" name=""/>
+        <p:cNvGrpSpPr/>
+        <p:nvPr/>
+      </p:nvGrpSpPr>
+      <p:grpSpPr>
+        <a:xfrm>
+          <a:off x="0" y="0"/>
+          <a:ext cx="0" cy="0"/>
+          <a:chOff x="0" y="0"/>
+          <a:chExt cx="0" cy="0"/>
+        </a:xfrm>
+      </p:grpSpPr>
+      <p:sp>
+        <p:nvSpPr>
+          <p:cNvPr id="2" name="Title 1"/>
+          <p:cNvSpPr>
+            <a:spLocks noGrp="1"/>
+          </p:cNvSpPr>
+          <p:nvPr>
+            <p:ph type="title"/>
+          </p:nvPr>
+        </p:nvSpPr>
+        <p:spPr/>
+        <p:txBody>
+          <a:bodyPr/>
+          <a:lstStyle/>
+          <a:p>
+            <a:pPr algn="ctr"/>
+            <a:r>
+              <a:rPr lang="en-US" dirty="0" smtClean="0"/>
+              <a:t>Description</a:t>
+            </a:r>
+            <a:endParaRPr lang="en-US" dirty="0"/>
+          </a:p>
+        </p:txBody>
+      </p:sp>
+      <p:sp>
+        <p:nvSpPr>
+          <p:cNvPr id="3" name="Content Placeholder 2"/>
+          <p:cNvSpPr>
+            <a:spLocks noGrp="1"/>
+          </p:cNvSpPr>
+          <p:nvPr>
+            <p:ph idx="1"/>
+          </p:nvPr>
+        </p:nvSpPr>
+        <p:spPr>
+          <a:xfrm>
+            <a:off x="2128220" y="1512933"/>
+            <a:ext cx="8506252" cy="3777622"/>
+          </a:xfrm>
+        </p:spPr>
+        <p:txBody>
+          <a:bodyPr/>
+          <a:lstStyle/>
+          <a:p>
+            <a:r>
+              <a:rPr lang="en-US" dirty="0"/>
+              <a:t>Compile/run the </a:t>
+            </a:r>
+            <a:r>
+              <a:rPr lang="en-US" dirty="0" smtClean="0"/>
+              <a:t>server application</a:t>
+            </a:r>
+          </a:p>
+          <a:p>
+            <a:pPr lvl="1"/>
+            <a:r>
+              <a:rPr lang="en-US" dirty="0" smtClean="0"/>
+              <a:t>Creates a server listening to a port</a:t>
+            </a:r>
+          </a:p>
+          <a:p>
+            <a:r>
+              <a:rPr lang="en-US" dirty="0"/>
+              <a:t>Compile/run the </a:t>
+            </a:r>
+            <a:r>
+              <a:rPr lang="en-US" dirty="0" smtClean="0"/>
+              <a:t>client application</a:t>
+            </a:r>
+            <a:endParaRPr lang="en-US" dirty="0"/>
+          </a:p>
+          <a:p>
+            <a:pPr lvl="1"/>
+            <a:r>
+              <a:rPr lang="en-US" dirty="0" smtClean="0"/>
+              <a:t>Makes a TCP connection with the server</a:t>
+            </a:r>
+          </a:p>
+          <a:p>
+            <a:pPr lvl="1"/>
+            <a:r>
+              <a:rPr lang="en-US" dirty="0" smtClean="0"/>
+              <a:t>Turns a file into packets, sends them to the server, and reassembles them in the desired directory</a:t>
+            </a:r>
+            <a:endParaRPr lang="en-US" dirty="0"/>
+          </a:p>
+          <a:p>
+            <a:endParaRPr lang="en-US" dirty="0"/>
+          </a:p>
+        </p:txBody>
+      </p:sp>
+      <p:pic>
+        <p:nvPicPr>
+          <p:cNvPr id="4" name="Picture 3"/>
+          <p:cNvPicPr>
+            <a:picLocks noChangeAspect="1"/>
+          </p:cNvPicPr>
+          <p:nvPr/>
+        </p:nvPicPr>
+        <p:blipFill>
+          <a:blip r:embed="rId2">
+            <a:extLst>
+              <a:ext uri="{28A0092B-C50C-407E-A947-70E740481C1C}">
+                <a14:useLocalDpi xmlns:a14="http://schemas.microsoft.com/office/drawing/2010/main" val="0"/>
+              </a:ext>
+            </a:extLst>
+          </a:blip>
+          <a:stretch>
+            <a:fillRect/>
+          </a:stretch>
+        </p:blipFill>
+        <p:spPr>
+          <a:xfrm>
+            <a:off x="-859749" y="4549106"/>
+            <a:ext cx="5273515" cy="1894071"/>
+          </a:xfrm>
+          <a:prstGeom prst="rect">
+            <a:avLst/>
+          </a:prstGeom>
+        </p:spPr>
+      </p:pic>
+      <p:pic>
+        <p:nvPicPr>
+          <p:cNvPr id="5" name="Picture 4"/>
+          <p:cNvPicPr>
+            <a:picLocks noChangeAspect="1"/>
+          </p:cNvPicPr>
+          <p:nvPr/>
+        </p:nvPicPr>
+        <p:blipFill>
+          <a:blip r:embed="rId3">
+            <a:extLst>
+              <a:ext uri="{28A0092B-C50C-407E-A947-70E740481C1C}">
+                <a14:useLocalDpi xmlns:a14="http://schemas.microsoft.com/office/drawing/2010/main" val="0"/>
+              </a:ext>
+            </a:extLst>
+          </a:blip>
+          <a:stretch>
+            <a:fillRect/>
+          </a:stretch>
+        </p:blipFill>
+        <p:spPr>
+          <a:xfrm>
+            <a:off x="5081406" y="4706543"/>
+            <a:ext cx="3654270" cy="1736634"/>
+          </a:xfrm>
+          <a:prstGeom prst="rect">
+            <a:avLst/>
+          </a:prstGeom>
+        </p:spPr>
+      </p:pic>
+      <p:pic>
+        <p:nvPicPr>
+          <p:cNvPr id="8" name="Picture 7"/>
+          <p:cNvPicPr>
+            <a:picLocks noChangeAspect="1"/>
+          </p:cNvPicPr>
+          <p:nvPr/>
+        </p:nvPicPr>
+        <p:blipFill>
+          <a:blip r:embed="rId4">
+            <a:extLst>
+              <a:ext uri="{28A0092B-C50C-407E-A947-70E740481C1C}">
+                <a14:useLocalDpi xmlns:a14="http://schemas.microsoft.com/office/drawing/2010/main" val="0"/>
+              </a:ext>
+            </a:extLst>
+          </a:blip>
+          <a:stretch>
+            <a:fillRect/>
+          </a:stretch>
+        </p:blipFill>
+        <p:spPr>
+          <a:xfrm>
+            <a:off x="9403317" y="4199725"/>
+            <a:ext cx="2592832" cy="2592832"/>
+          </a:xfrm>
+          <a:prstGeom prst="rect">
+            <a:avLst/>
+          </a:prstGeom>
+        </p:spPr>
+      </p:pic>
+    </p:spTree>
+    <p:extLst>
+      <p:ext uri="{BB962C8B-B14F-4D97-AF65-F5344CB8AC3E}">
+        <p14:creationId xmlns:p14="http://schemas.microsoft.com/office/powerpoint/2010/main" val="469770743"/>
+      </p:ext>
+    </p:extLst>
+  </p:cSld>
+  <p:clrMapOvr>
+    <a:masterClrMapping/>
+  </p:clrMapOvr>
+</p:sld>
+</file>
+
+<file path=ppt/slides/slide3.xml><?xml version="1.0" encoding="utf-8"?>
+<p:sld xmlns:a="http://schemas.openxmlformats.org/drawingml/2006/main" xmlns:r="http://schemas.openxmlformats.org/officeDocument/2006/relationships" xmlns:p="http://schemas.openxmlformats.org/presentationml/2006/main">
+  <p:cSld>
+    <p:spTree>
+      <p:nvGrpSpPr>
+        <p:cNvPr id="1" name=""/>
+        <p:cNvGrpSpPr/>
+        <p:nvPr/>
+      </p:nvGrpSpPr>
+      <p:grpSpPr>
+        <a:xfrm>
+          <a:off x="0" y="0"/>
+          <a:ext cx="0" cy="0"/>
+          <a:chOff x="0" y="0"/>
+          <a:chExt cx="0" cy="0"/>
+        </a:xfrm>
+      </p:grpSpPr>
+      <p:sp>
+        <p:nvSpPr>
+          <p:cNvPr id="2" name="Title 1"/>
+          <p:cNvSpPr>
+            <a:spLocks noGrp="1"/>
+          </p:cNvSpPr>
+          <p:nvPr>
+            <p:ph type="title"/>
+          </p:nvPr>
+        </p:nvSpPr>
+        <p:spPr/>
+        <p:txBody>
+          <a:bodyPr/>
+          <a:lstStyle/>
+          <a:p>
+            <a:pPr algn="ctr"/>
+            <a:r>
+              <a:rPr lang="en-US" dirty="0" smtClean="0"/>
+              <a:t>User’s Point of View</a:t>
+            </a:r>
+            <a:endParaRPr lang="en-US" dirty="0"/>
+          </a:p>
+        </p:txBody>
+      </p:sp>
+      <p:sp>
+        <p:nvSpPr>
+          <p:cNvPr id="3" name="Content Placeholder 2"/>
+          <p:cNvSpPr>
+            <a:spLocks noGrp="1"/>
+          </p:cNvSpPr>
+          <p:nvPr>
+            <p:ph idx="1"/>
+          </p:nvPr>
+        </p:nvSpPr>
+        <p:spPr/>
+        <p:txBody>
+          <a:bodyPr/>
+          <a:lstStyle/>
+          <a:p>
+            <a:endParaRPr lang="en-US" dirty="0"/>
+          </a:p>
+        </p:txBody>
+      </p:sp>
+    </p:spTree>
+    <p:extLst>
+      <p:ext uri="{BB962C8B-B14F-4D97-AF65-F5344CB8AC3E}">
+        <p14:creationId xmlns:p14="http://schemas.microsoft.com/office/powerpoint/2010/main" val="1841518800"/>
+      </p:ext>
+    </p:extLst>
+  </p:cSld>
+  <p:clrMapOvr>
+    <a:masterClrMapping/>
+  </p:clrMapOvr>
+</p:sld>
+</file>
+
+<file path=ppt/slides/slide4.xml><?xml version="1.0" encoding="utf-8"?>
+<p:sld xmlns:a="http://schemas.openxmlformats.org/drawingml/2006/main" xmlns:r="http://schemas.openxmlformats.org/officeDocument/2006/relationships" xmlns:p="http://schemas.openxmlformats.org/presentationml/2006/main">
+  <p:cSld>
+    <p:spTree>
+      <p:nvGrpSpPr>
+        <p:cNvPr id="1" name=""/>
+        <p:cNvGrpSpPr/>
+        <p:nvPr/>
+      </p:nvGrpSpPr>
+      <p:grpSpPr>
+        <a:xfrm>
+          <a:off x="0" y="0"/>
+          <a:ext cx="0" cy="0"/>
+          <a:chOff x="0" y="0"/>
+          <a:chExt cx="0" cy="0"/>
+        </a:xfrm>
+      </p:grpSpPr>
+      <p:sp>
+        <p:nvSpPr>
+          <p:cNvPr id="2" name="Title 1"/>
+          <p:cNvSpPr>
+            <a:spLocks noGrp="1"/>
+          </p:cNvSpPr>
+          <p:nvPr>
+            <p:ph type="title"/>
+          </p:nvPr>
+        </p:nvSpPr>
+        <p:spPr/>
+        <p:txBody>
+          <a:bodyPr/>
+          <a:lstStyle/>
+          <a:p>
+            <a:pPr algn="ctr"/>
+            <a:r>
+              <a:rPr lang="en-US" dirty="0" smtClean="0"/>
+              <a:t>Why I’m Interested</a:t>
+            </a:r>
+            <a:endParaRPr lang="en-US" dirty="0"/>
+          </a:p>
+        </p:txBody>
+      </p:sp>
+      <p:sp>
+        <p:nvSpPr>
+          <p:cNvPr id="3" name="Content Placeholder 2"/>
+          <p:cNvSpPr>
+            <a:spLocks noGrp="1"/>
+          </p:cNvSpPr>
+          <p:nvPr>
+            <p:ph idx="1"/>
+          </p:nvPr>
+        </p:nvSpPr>
+        <p:spPr/>
+        <p:txBody>
+          <a:bodyPr/>
+          <a:lstStyle/>
+          <a:p>
+            <a:r>
+              <a:rPr lang="en-US" dirty="0" smtClean="0"/>
+              <a:t>Computer Networks</a:t>
+            </a:r>
+          </a:p>
+          <a:p>
+            <a:r>
+              <a:rPr lang="en-US" dirty="0" smtClean="0"/>
+              <a:t>SRE/DevOps</a:t>
+            </a:r>
+            <a:endParaRPr lang="en-US" dirty="0"/>
+          </a:p>
+        </p:txBody>
+      </p:sp>
+    </p:spTree>
+    <p:extLst>
+      <p:ext uri="{BB962C8B-B14F-4D97-AF65-F5344CB8AC3E}">
+        <p14:creationId xmlns:p14="http://schemas.microsoft.com/office/powerpoint/2010/main" val="298169133"/>
+      </p:ext>
+    </p:extLst>
+  </p:cSld>
+  <p:clrMapOvr>
+    <a:masterClrMapping/>
+  </p:clrMapOvr>
+</p:sld>
+</file>
+
+<file path=ppt/slides/slide5.xml><?xml version="1.0" encoding="utf-8"?>
+<p:sld xmlns:a="http://schemas.openxmlformats.org/drawingml/2006/main" xmlns:r="http://schemas.openxmlformats.org/officeDocument/2006/relationships" xmlns:p="http://schemas.openxmlformats.org/presentationml/2006/main">
+  <p:cSld>
+    <p:spTree>
+      <p:nvGrpSpPr>
+        <p:cNvPr id="1" name=""/>
+        <p:cNvGrpSpPr/>
+        <p:nvPr/>
+      </p:nvGrpSpPr>
+      <p:grpSpPr>
+        <a:xfrm>
+          <a:off x="0" y="0"/>
+          <a:ext cx="0" cy="0"/>
+          <a:chOff x="0" y="0"/>
+          <a:chExt cx="0" cy="0"/>
+        </a:xfrm>
+      </p:grpSpPr>
+      <p:sp>
+        <p:nvSpPr>
+          <p:cNvPr id="2" name="Title 1"/>
+          <p:cNvSpPr>
+            <a:spLocks noGrp="1"/>
+          </p:cNvSpPr>
+          <p:nvPr>
+            <p:ph type="title"/>
+          </p:nvPr>
+        </p:nvSpPr>
+        <p:spPr>
+          <a:xfrm>
+            <a:off x="1788253" y="2763806"/>
+            <a:ext cx="8911687" cy="1280890"/>
+          </a:xfrm>
+        </p:spPr>
+        <p:txBody>
+          <a:bodyPr/>
+          <a:lstStyle/>
+          <a:p>
+            <a:pPr algn="ctr"/>
+            <a:r>
+              <a:rPr lang="en-US" smtClean="0"/>
+              <a:t>Questions?</a:t>
+            </a:r>
+            <a:endParaRPr lang="en-US" dirty="0"/>
+          </a:p>
+        </p:txBody>
+      </p:sp>
+    </p:spTree>
+    <p:extLst>
+      <p:ext uri="{BB962C8B-B14F-4D97-AF65-F5344CB8AC3E}">
+        <p14:creationId xmlns:p14="http://schemas.microsoft.com/office/powerpoint/2010/main" val="1644152377"/>
       </p:ext>
     </p:extLst>
   </p:cSld>

</xml_diff>

<commit_message>
Adding image to proposal presentation
</commit_message>
<xml_diff>
--- a/documents/proposal_presentation.pptx
+++ b/documents/proposal_presentation.pptx
@@ -5,14 +5,15 @@
     <p:sldMasterId id="2147483648" r:id="rId1"/>
   </p:sldMasterIdLst>
   <p:notesMasterIdLst>
-    <p:notesMasterId r:id="rId7"/>
+    <p:notesMasterId r:id="rId8"/>
   </p:notesMasterIdLst>
   <p:sldIdLst>
     <p:sldId id="256" r:id="rId2"/>
     <p:sldId id="257" r:id="rId3"/>
-    <p:sldId id="258" r:id="rId4"/>
-    <p:sldId id="259" r:id="rId5"/>
-    <p:sldId id="260" r:id="rId6"/>
+    <p:sldId id="261" r:id="rId4"/>
+    <p:sldId id="258" r:id="rId5"/>
+    <p:sldId id="259" r:id="rId6"/>
+    <p:sldId id="260" r:id="rId7"/>
   </p:sldIdLst>
   <p:sldSz cx="12192000" cy="6858000"/>
   <p:notesSz cx="6858000" cy="9144000"/>
@@ -534,7 +535,91 @@
           <a:p>
             <a:fld id="{A5F153E4-C6B4-3749-A6A7-3444A3D1E80F}" type="slidenum">
               <a:rPr lang="en-US" smtClean="0"/>
-              <a:t>4</a:t>
+              <a:t>1</a:t>
+            </a:fld>
+            <a:endParaRPr lang="en-US"/>
+          </a:p>
+        </p:txBody>
+      </p:sp>
+    </p:spTree>
+    <p:extLst>
+      <p:ext uri="{BB962C8B-B14F-4D97-AF65-F5344CB8AC3E}">
+        <p14:creationId xmlns:p14="http://schemas.microsoft.com/office/powerpoint/2010/main" val="659752459"/>
+      </p:ext>
+    </p:extLst>
+  </p:cSld>
+  <p:clrMapOvr>
+    <a:masterClrMapping/>
+  </p:clrMapOvr>
+</p:notes>
+</file>
+
+<file path=ppt/notesSlides/notesSlide2.xml><?xml version="1.0" encoding="utf-8"?>
+<p:notes xmlns:a="http://schemas.openxmlformats.org/drawingml/2006/main" xmlns:r="http://schemas.openxmlformats.org/officeDocument/2006/relationships" xmlns:p="http://schemas.openxmlformats.org/presentationml/2006/main">
+  <p:cSld>
+    <p:spTree>
+      <p:nvGrpSpPr>
+        <p:cNvPr id="1" name=""/>
+        <p:cNvGrpSpPr/>
+        <p:nvPr/>
+      </p:nvGrpSpPr>
+      <p:grpSpPr>
+        <a:xfrm>
+          <a:off x="0" y="0"/>
+          <a:ext cx="0" cy="0"/>
+          <a:chOff x="0" y="0"/>
+          <a:chExt cx="0" cy="0"/>
+        </a:xfrm>
+      </p:grpSpPr>
+      <p:sp>
+        <p:nvSpPr>
+          <p:cNvPr id="2" name="Slide Image Placeholder 1"/>
+          <p:cNvSpPr>
+            <a:spLocks noGrp="1" noRot="1" noChangeAspect="1"/>
+          </p:cNvSpPr>
+          <p:nvPr>
+            <p:ph type="sldImg"/>
+          </p:nvPr>
+        </p:nvSpPr>
+        <p:spPr/>
+      </p:sp>
+      <p:sp>
+        <p:nvSpPr>
+          <p:cNvPr id="3" name="Notes Placeholder 2"/>
+          <p:cNvSpPr>
+            <a:spLocks noGrp="1"/>
+          </p:cNvSpPr>
+          <p:nvPr>
+            <p:ph type="body" idx="1"/>
+          </p:nvPr>
+        </p:nvSpPr>
+        <p:spPr/>
+        <p:txBody>
+          <a:bodyPr/>
+          <a:lstStyle/>
+          <a:p>
+            <a:endParaRPr lang="en-US" dirty="0"/>
+          </a:p>
+        </p:txBody>
+      </p:sp>
+      <p:sp>
+        <p:nvSpPr>
+          <p:cNvPr id="4" name="Slide Number Placeholder 3"/>
+          <p:cNvSpPr>
+            <a:spLocks noGrp="1"/>
+          </p:cNvSpPr>
+          <p:nvPr>
+            <p:ph type="sldNum" sz="quarter" idx="10"/>
+          </p:nvPr>
+        </p:nvSpPr>
+        <p:spPr/>
+        <p:txBody>
+          <a:bodyPr/>
+          <a:lstStyle/>
+          <a:p>
+            <a:fld id="{A5F153E4-C6B4-3749-A6A7-3444A3D1E80F}" type="slidenum">
+              <a:rPr lang="en-US" smtClean="0"/>
+              <a:t>5</a:t>
             </a:fld>
             <a:endParaRPr lang="en-US"/>
           </a:p>
@@ -8248,11 +8333,7 @@
             <a:pPr lvl="1"/>
             <a:r>
               <a:rPr lang="en-US" dirty="0" smtClean="0"/>
-              <a:t>Turns a file into packets, sends them to the server, and reassembles them in the desired </a:t>
-            </a:r>
-            <a:r>
-              <a:rPr lang="en-US" dirty="0" smtClean="0"/>
-              <a:t>directory</a:t>
+              <a:t>Turns a file into packets, sends them to the server, and reassembles them in the desired directory</a:t>
             </a:r>
           </a:p>
           <a:p>
@@ -8405,6 +8486,91 @@
             <p:ph type="title"/>
           </p:nvPr>
         </p:nvSpPr>
+        <p:spPr/>
+        <p:txBody>
+          <a:bodyPr/>
+          <a:lstStyle/>
+          <a:p>
+            <a:endParaRPr lang="en-US"/>
+          </a:p>
+        </p:txBody>
+      </p:sp>
+      <p:pic>
+        <p:nvPicPr>
+          <p:cNvPr id="4" name="Content Placeholder 3"/>
+          <p:cNvPicPr>
+            <a:picLocks noGrp="1" noChangeAspect="1"/>
+          </p:cNvPicPr>
+          <p:nvPr>
+            <p:ph idx="1"/>
+          </p:nvPr>
+        </p:nvPicPr>
+        <p:blipFill>
+          <a:blip r:embed="rId2">
+            <a:extLst>
+              <a:ext uri="{28A0092B-C50C-407E-A947-70E740481C1C}">
+                <a14:useLocalDpi xmlns:a14="http://schemas.microsoft.com/office/drawing/2010/main" val="0"/>
+              </a:ext>
+            </a:extLst>
+          </a:blip>
+          <a:stretch>
+            <a:fillRect/>
+          </a:stretch>
+        </p:blipFill>
+        <p:spPr>
+          <a:xfrm>
+            <a:off x="-275058" y="0"/>
+            <a:ext cx="12482601" cy="6858000"/>
+          </a:xfrm>
+        </p:spPr>
+      </p:pic>
+    </p:spTree>
+    <p:extLst>
+      <p:ext uri="{BB962C8B-B14F-4D97-AF65-F5344CB8AC3E}">
+        <p14:creationId xmlns:p14="http://schemas.microsoft.com/office/powerpoint/2010/main" val="945585214"/>
+      </p:ext>
+    </p:extLst>
+  </p:cSld>
+  <p:clrMapOvr>
+    <a:masterClrMapping/>
+  </p:clrMapOvr>
+  <p:timing>
+    <p:tnLst>
+      <p:par>
+        <p:cTn id="1" dur="indefinite" restart="never" nodeType="tmRoot"/>
+      </p:par>
+    </p:tnLst>
+  </p:timing>
+</p:sld>
+</file>
+
+<file path=ppt/slides/slide4.xml><?xml version="1.0" encoding="utf-8"?>
+<p:sld xmlns:a="http://schemas.openxmlformats.org/drawingml/2006/main" xmlns:r="http://schemas.openxmlformats.org/officeDocument/2006/relationships" xmlns:p="http://schemas.openxmlformats.org/presentationml/2006/main">
+  <p:cSld>
+    <p:spTree>
+      <p:nvGrpSpPr>
+        <p:cNvPr id="1" name=""/>
+        <p:cNvGrpSpPr/>
+        <p:nvPr/>
+      </p:nvGrpSpPr>
+      <p:grpSpPr>
+        <a:xfrm>
+          <a:off x="0" y="0"/>
+          <a:ext cx="0" cy="0"/>
+          <a:chOff x="0" y="0"/>
+          <a:chExt cx="0" cy="0"/>
+        </a:xfrm>
+      </p:grpSpPr>
+      <p:sp>
+        <p:nvSpPr>
+          <p:cNvPr id="2" name="Title 1"/>
+          <p:cNvSpPr>
+            <a:spLocks noGrp="1"/>
+          </p:cNvSpPr>
+          <p:nvPr>
+            <p:ph type="title"/>
+          </p:nvPr>
+        </p:nvSpPr>
         <p:spPr>
           <a:xfrm>
             <a:off x="1745692" y="650488"/>
@@ -8503,7 +8669,7 @@
 </p:sld>
 </file>
 
-<file path=ppt/slides/slide4.xml><?xml version="1.0" encoding="utf-8"?>
+<file path=ppt/slides/slide5.xml><?xml version="1.0" encoding="utf-8"?>
 <p:sld xmlns:a="http://schemas.openxmlformats.org/drawingml/2006/main" xmlns:r="http://schemas.openxmlformats.org/officeDocument/2006/relationships" xmlns:p="http://schemas.openxmlformats.org/presentationml/2006/main">
   <p:cSld>
     <p:spTree>
@@ -8568,12 +8734,28 @@
               <a:rPr lang="en-US" dirty="0" smtClean="0"/>
               <a:t>SRE/DevOps</a:t>
             </a:r>
-            <a:endParaRPr lang="en-US" dirty="0" smtClean="0"/>
           </a:p>
           <a:p>
             <a:r>
               <a:rPr lang="en-US" dirty="0" smtClean="0"/>
-              <a:t>Computer Networks</a:t>
+              <a:t>Computer </a:t>
+            </a:r>
+            <a:r>
+              <a:rPr lang="en-US" dirty="0" smtClean="0"/>
+              <a:t>Networks</a:t>
+            </a:r>
+          </a:p>
+          <a:p>
+            <a:r>
+              <a:rPr lang="en-US" dirty="0" smtClean="0"/>
+              <a:t>Relevant coursework</a:t>
+            </a:r>
+          </a:p>
+          <a:p>
+            <a:pPr lvl="1"/>
+            <a:r>
+              <a:rPr lang="en-US" dirty="0" smtClean="0"/>
+              <a:t>CMSI 281, 284, 386, 387 </a:t>
             </a:r>
             <a:endParaRPr lang="en-US" dirty="0" smtClean="0"/>
           </a:p>
@@ -8629,7 +8811,7 @@
 </p:sld>
 </file>
 
-<file path=ppt/slides/slide5.xml><?xml version="1.0" encoding="utf-8"?>
+<file path=ppt/slides/slide6.xml><?xml version="1.0" encoding="utf-8"?>
 <p:sld xmlns:a="http://schemas.openxmlformats.org/drawingml/2006/main" xmlns:r="http://schemas.openxmlformats.org/officeDocument/2006/relationships" xmlns:p="http://schemas.openxmlformats.org/presentationml/2006/main">
   <p:cSld>
     <p:spTree>
@@ -8685,6 +8867,13 @@
   <p:clrMapOvr>
     <a:masterClrMapping/>
   </p:clrMapOvr>
+  <p:timing>
+    <p:tnLst>
+      <p:par>
+        <p:cTn id="1" dur="indefinite" restart="never" nodeType="tmRoot"/>
+      </p:par>
+    </p:tnLst>
+  </p:timing>
 </p:sld>
 </file>
 

</xml_diff>